<commit_message>
Studying for the ML final
</commit_message>
<xml_diff>
--- a/Lectures/Lecture 07_Imbalanced Data.pptx
+++ b/Lectures/Lecture 07_Imbalanced Data.pptx
@@ -274,7 +274,7 @@
           <a:p>
             <a:fld id="{345D2AFB-E5D9-EA40-AEEF-87383F964993}" type="datetimeFigureOut">
               <a:rPr lang="en-US" smtClean="0"/>
-              <a:t>9/19/23</a:t>
+              <a:t>12/12/23</a:t>
             </a:fld>
             <a:endParaRPr lang="en-US"/>
           </a:p>
@@ -451,7 +451,7 @@
           <a:p>
             <a:fld id="{3FE918EF-26F2-F641-9B39-65E2E78847ED}" type="datetimeFigureOut">
               <a:rPr lang="en-US" smtClean="0"/>
-              <a:t>9/19/23</a:t>
+              <a:t>12/12/23</a:t>
             </a:fld>
             <a:endParaRPr lang="en-US"/>
           </a:p>
@@ -1269,7 +1269,7 @@
             <a:fld id="{23A271A1-F6D6-438B-A432-4747EE7ECD40}" type="datetimeFigureOut">
               <a:rPr lang="en-US" smtClean="0"/>
               <a:pPr algn="ctr" eaLnBrk="1" latinLnBrk="0" hangingPunct="1"/>
-              <a:t>9/19/23</a:t>
+              <a:t>12/12/23</a:t>
             </a:fld>
             <a:endParaRPr lang="en-US" sz="2000" dirty="0">
               <a:solidFill>
@@ -1475,7 +1475,7 @@
             <a:fld id="{23A271A1-F6D6-438B-A432-4747EE7ECD40}" type="datetimeFigureOut">
               <a:rPr lang="en-US" smtClean="0"/>
               <a:pPr eaLnBrk="1" latinLnBrk="0" hangingPunct="1"/>
-              <a:t>9/19/23</a:t>
+              <a:t>12/12/23</a:t>
             </a:fld>
             <a:endParaRPr lang="en-US"/>
           </a:p>
@@ -1662,7 +1662,7 @@
             <a:fld id="{23A271A1-F6D6-438B-A432-4747EE7ECD40}" type="datetimeFigureOut">
               <a:rPr lang="en-US" smtClean="0"/>
               <a:pPr eaLnBrk="1" latinLnBrk="0" hangingPunct="1"/>
-              <a:t>9/19/23</a:t>
+              <a:t>12/12/23</a:t>
             </a:fld>
             <a:endParaRPr lang="en-US" dirty="0"/>
           </a:p>
@@ -1927,7 +1927,7 @@
             <a:fld id="{23A271A1-F6D6-438B-A432-4747EE7ECD40}" type="datetimeFigureOut">
               <a:rPr lang="en-US" smtClean="0"/>
               <a:pPr eaLnBrk="1" latinLnBrk="0" hangingPunct="1"/>
-              <a:t>9/19/23</a:t>
+              <a:t>12/12/23</a:t>
             </a:fld>
             <a:endParaRPr lang="en-US" dirty="0"/>
           </a:p>
@@ -2349,7 +2349,7 @@
             <a:fld id="{23A271A1-F6D6-438B-A432-4747EE7ECD40}" type="datetimeFigureOut">
               <a:rPr lang="en-US" smtClean="0"/>
               <a:pPr eaLnBrk="1" latinLnBrk="0" hangingPunct="1"/>
-              <a:t>9/19/23</a:t>
+              <a:t>12/12/23</a:t>
             </a:fld>
             <a:endParaRPr lang="en-US"/>
           </a:p>
@@ -2598,7 +2598,7 @@
             <a:fld id="{23A271A1-F6D6-438B-A432-4747EE7ECD40}" type="datetimeFigureOut">
               <a:rPr lang="en-US" smtClean="0"/>
               <a:pPr eaLnBrk="1" latinLnBrk="0" hangingPunct="1"/>
-              <a:t>9/19/23</a:t>
+              <a:t>12/12/23</a:t>
             </a:fld>
             <a:endParaRPr lang="en-US"/>
           </a:p>
@@ -2837,7 +2837,7 @@
             <a:fld id="{23A271A1-F6D6-438B-A432-4747EE7ECD40}" type="datetimeFigureOut">
               <a:rPr lang="en-US" smtClean="0"/>
               <a:pPr eaLnBrk="1" latinLnBrk="0" hangingPunct="1"/>
-              <a:t>9/19/23</a:t>
+              <a:t>12/12/23</a:t>
             </a:fld>
             <a:endParaRPr lang="en-US"/>
           </a:p>
@@ -3035,7 +3035,7 @@
             <a:fld id="{23A271A1-F6D6-438B-A432-4747EE7ECD40}" type="datetimeFigureOut">
               <a:rPr lang="en-US" smtClean="0"/>
               <a:pPr eaLnBrk="1" latinLnBrk="0" hangingPunct="1"/>
-              <a:t>9/19/23</a:t>
+              <a:t>12/12/23</a:t>
             </a:fld>
             <a:endParaRPr lang="en-US"/>
           </a:p>
@@ -3140,7 +3140,7 @@
             <a:fld id="{23A271A1-F6D6-438B-A432-4747EE7ECD40}" type="datetimeFigureOut">
               <a:rPr lang="en-US" smtClean="0"/>
               <a:pPr eaLnBrk="1" latinLnBrk="0" hangingPunct="1"/>
-              <a:t>9/19/23</a:t>
+              <a:t>12/12/23</a:t>
             </a:fld>
             <a:endParaRPr lang="en-US"/>
           </a:p>
@@ -3282,7 +3282,7 @@
             <a:fld id="{23A271A1-F6D6-438B-A432-4747EE7ECD40}" type="datetimeFigureOut">
               <a:rPr lang="en-US" smtClean="0"/>
               <a:pPr eaLnBrk="1" latinLnBrk="0" hangingPunct="1"/>
-              <a:t>9/19/23</a:t>
+              <a:t>12/12/23</a:t>
             </a:fld>
             <a:endParaRPr lang="en-US"/>
           </a:p>
@@ -3806,7 +3806,7 @@
             <a:fld id="{23A271A1-F6D6-438B-A432-4747EE7ECD40}" type="datetimeFigureOut">
               <a:rPr lang="en-US" smtClean="0"/>
               <a:pPr eaLnBrk="1" latinLnBrk="0" hangingPunct="1"/>
-              <a:t>9/19/23</a:t>
+              <a:t>12/12/23</a:t>
             </a:fld>
             <a:endParaRPr lang="en-US"/>
           </a:p>
@@ -4069,7 +4069,7 @@
             <a:fld id="{23A271A1-F6D6-438B-A432-4747EE7ECD40}" type="datetimeFigureOut">
               <a:rPr lang="en-US" smtClean="0"/>
               <a:pPr eaLnBrk="1" latinLnBrk="0" hangingPunct="1"/>
-              <a:t>9/19/23</a:t>
+              <a:t>12/12/23</a:t>
             </a:fld>
             <a:endParaRPr lang="en-US" sz="1400" dirty="0">
               <a:solidFill>
@@ -29325,7 +29325,7 @@
                       <a:noFill/>
                       <a:extLst>
                         <a:ext uri="{909E8E84-426E-40dd-AFC4-6F175D3DCCD1}">
-                          <a14:hiddenFill xmlns="" xmlns:a14="http://schemas.microsoft.com/office/drawing/2010/main">
+                          <a14:hiddenFill xmlns:a14="http://schemas.microsoft.com/office/drawing/2010/main" xmlns="">
                             <a:solidFill>
                               <a:srgbClr val="FFFFFF"/>
                             </a:solidFill>
@@ -29424,7 +29424,7 @@
                       <a:noFill/>
                       <a:extLst>
                         <a:ext uri="{909E8E84-426E-40dd-AFC4-6F175D3DCCD1}">
-                          <a14:hiddenFill xmlns="" xmlns:a14="http://schemas.microsoft.com/office/drawing/2010/main">
+                          <a14:hiddenFill xmlns:a14="http://schemas.microsoft.com/office/drawing/2010/main" xmlns="">
                             <a:solidFill>
                               <a:srgbClr val="FFFFFF"/>
                             </a:solidFill>
@@ -29632,7 +29632,7 @@
                       <a:noFill/>
                       <a:extLst>
                         <a:ext uri="{909E8E84-426E-40dd-AFC4-6F175D3DCCD1}">
-                          <a14:hiddenFill xmlns="" xmlns:a14="http://schemas.microsoft.com/office/drawing/2010/main">
+                          <a14:hiddenFill xmlns:a14="http://schemas.microsoft.com/office/drawing/2010/main" xmlns="">
                             <a:solidFill>
                               <a:srgbClr val="FFFFFF"/>
                             </a:solidFill>
@@ -29702,7 +29702,7 @@
                       <a:noFill/>
                       <a:extLst>
                         <a:ext uri="{909E8E84-426E-40dd-AFC4-6F175D3DCCD1}">
-                          <a14:hiddenFill xmlns="" xmlns:a14="http://schemas.microsoft.com/office/drawing/2010/main">
+                          <a14:hiddenFill xmlns:a14="http://schemas.microsoft.com/office/drawing/2010/main" xmlns="">
                             <a:solidFill>
                               <a:srgbClr val="FFFFFF"/>
                             </a:solidFill>
@@ -29927,7 +29927,7 @@
                       <a:noFill/>
                       <a:extLst>
                         <a:ext uri="{909E8E84-426E-40dd-AFC4-6F175D3DCCD1}">
-                          <a14:hiddenFill xmlns="" xmlns:a14="http://schemas.microsoft.com/office/drawing/2010/main">
+                          <a14:hiddenFill xmlns:a14="http://schemas.microsoft.com/office/drawing/2010/main" xmlns="">
                             <a:solidFill>
                               <a:srgbClr val="FFFFFF"/>
                             </a:solidFill>
@@ -32774,7 +32774,7 @@
             <a:pPr lvl="1"/>
             <a:r>
               <a:rPr lang="en-US" dirty="0"/>
-              <a:t>Utilizes all of the training data</a:t>
+              <a:t>Utilizes all training data</a:t>
             </a:r>
           </a:p>
           <a:p>
@@ -33908,7 +33908,15 @@
           <a:p>
             <a:r>
               <a:rPr lang="en-US" sz="2400" dirty="0"/>
-              <a:t>In general, any time we do a count, use the weighted count (e.g. in calculating the majority label at a leaf)</a:t>
+              <a:t>In general, any time we do a count, use the weighted count (e.</a:t>
+            </a:r>
+            <a:r>
+              <a:rPr lang="en-US" sz="2400"/>
+              <a:t>g., </a:t>
+            </a:r>
+            <a:r>
+              <a:rPr lang="en-US" sz="2400" dirty="0"/>
+              <a:t>in calculating the majority label at a leaf)</a:t>
             </a:r>
           </a:p>
         </p:txBody>

</xml_diff>